<commit_message>
Added a new foler for tasks
</commit_message>
<xml_diff>
--- a/ML_Seminar/illustrations_ppt/01_seminar_intro.pptx
+++ b/ML_Seminar/illustrations_ppt/01_seminar_intro.pptx
@@ -646,87 +646,6 @@
 </inkml:ink>
 </file>
 
-<file path=ppt/ink/ink26.xml><?xml version="1.0" encoding="utf-8"?>
-<inkml:ink xmlns:inkml="http://www.w3.org/2003/InkML">
-  <inkml:definitions>
-    <inkml:context xml:id="ctx0">
-      <inkml:inkSource xml:id="inkSrc0">
-        <inkml:traceFormat>
-          <inkml:channel name="X" type="integer" min="-2.14748E9" max="2.14748E9" units="cm"/>
-          <inkml:channel name="Y" type="integer" min="-2.14748E9" max="2.14748E9" units="cm"/>
-          <inkml:channel name="F" type="integer" max="32767" units="dev"/>
-        </inkml:traceFormat>
-        <inkml:channelProperties>
-          <inkml:channelProperty channel="X" name="resolution" value="1000" units="1/cm"/>
-          <inkml:channelProperty channel="Y" name="resolution" value="1000" units="1/cm"/>
-          <inkml:channelProperty channel="F" name="resolution" value="0" units="1/dev"/>
-        </inkml:channelProperties>
-      </inkml:inkSource>
-      <inkml:timestamp xml:id="ts0" timeString="2024-01-17T09:53:44.828"/>
-    </inkml:context>
-    <inkml:brush xml:id="br0">
-      <inkml:brushProperty name="width" value="0.035" units="cm"/>
-      <inkml:brushProperty name="height" value="0.035" units="cm"/>
-    </inkml:brush>
-  </inkml:definitions>
-  <inkml:trace contextRef="#ctx0" brushRef="#br0">187 271 4353,'0'0'5481,"6"-34"-5046,21-106-147,-16 87-64,-9 47 173,-1 0 0,0 0 0,0-1 0,-1 1 0,0-6 0,-1 26-304,-1 0 0,-1 0 0,0 0 0,-1 0 0,0 0 0,-9 16 1,-6 23 91,-2 18-94,3 1-1,4 0 1,2 1-1,-4 131 0,16-182-87,0-11-2,-1-1 0,2 0-1,-1 1 1,2-1 0,3 16 0,-4-23 0,0 0 0,0 0-1,0 0 1,1-1 0,0 1 0,-1-1-1,1 1 1,0-1 0,0 0 0,0 1-1,0-1 1,1 0 0,-1 0-1,1-1 1,-1 1 0,1 0 0,-1-1-1,1 0 1,0 1 0,0-1 0,0 0-1,0-1 1,3 2 0,1 0 8,0-1 1,0 0-1,0 0 1,-1-1-1,1 0 0,0 0 1,0 0-1,0-1 1,0 0-1,0 0 1,0-1-1,-1 0 1,1 0-1,-1 0 0,1-1 1,-1 0-1,0-1 1,0 1-1,0-1 1,0 0-1,-1 0 0,0-1 1,0 0-1,5-5 1,8-13 46,-1 0 0,0 0 0,-2-2 0,17-37 0,35-109 143,-57 141-77,-2 0 1,-1-1 0,-1 0 0,-2 0 0,0-1 0,-3 1 0,-2-43-1,1 72-106,-1-1-1,1 1 1,-1 0-1,0-1 1,1 1-1,-1 0 1,0-1-1,0 1 1,-1 0 0,1 0-1,0 0 1,-1 0-1,1 0 1,-1 0-1,0 0 1,1 0-1,-1 1 1,0-1-1,0 0 1,0 1-1,-1 0 1,1 0-1,0-1 1,0 1-1,-1 1 1,1-1-1,0 0 1,-5 0-1,-5-1-195,-1 0-1,0 1 1,1 0 0,-19 3-1,7-2-1060,32 2-6683,-7-2 7858,1 0-1,0 0 1,-1 0-1,1 0 1,-1 0-1,1-1 1,0 1-1,-1 0 1,1-1-1,2-1 1,-1 0-10,-1 1 0,0-1 0,0 0 0,0 0 0,0-1 0,0 1 0,3-4 0,10-12 2755,-15 17-2594,1 1-1,-1 0 1,1-1 0,0 1 0,-1 0 0,1 0 0,-1-1-1,1 1 1,0 0 0,-1 0 0,1 0 0,0 0 0,-1 0-1,1 0 1,0 0 0,-1 0 0,1 0 0,-1 0 0,1 0-1,0 0 1,-1 1 0,1-1 0,0 0 0,-1 0 0,1 1-1,-1-1 1,1 0 0,-1 1 0,1-1 0,-1 0 0,1 1-1,0 0 1,14 17-109,-9-7 85,0 0 0,-1 1 0,-1 0 0,0-1 0,-1 2 0,0-1 0,0 0 0,0 19 0,-1 108 329,-3-84-273,0 23 34,3 93 806,-2-168-932,0 0-1,0 0 1,1-1-1,-1 1 1,1 0-1,0 0 1,0-1-1,0 1 1,0-1-1,0 1 1,1-1-1,-1 1 1,1-1-1,0 0 1,-1 1-1,1-1 1,0 0-1,0 0 1,1-1-1,-1 1 1,0 0-1,0-1 1,1 1-1,-1-1 1,1 0-1,0 0 1,-1 0-1,1 0 1,0 0-1,5 1 1,2-1-16,0 0 0,0 0 0,0-1 0,0-1 0,0 1 0,0-1 0,17-5 1,-12 1 52,0 0 1,-1-1 0,1 0 0,-2-1 0,1-1-1,-1-1 1,0 1 0,0-2 0,19-19 0,-10 6 55,0-1 0,-1 0 0,30-50 0,-37 51 14,-1 0 0,11-28-1,-20 39 326,0 0-1,0 0 0,-1-1 0,-1 1 0,0 0 0,0-20 1,-16 43 465,4 4-890,0 0 0,1 1-1,0 0 1,2 1 0,0-1-1,0 1 1,-6 31 0,6-16-63,1 1 1,2 1 0,0 46-1,4-76-1,0 1-1,0-1 0,0 1 0,1 0 0,0-1 0,0 1 0,0-1 0,2 6 1,-2-8 9,0-1 1,0 1-1,0-1 0,0 0 1,1 1-1,-1-1 1,0 0-1,1 0 1,-1 0-1,1 0 0,-1 0 1,1 0-1,-1 0 1,1 0-1,0-1 1,-1 1-1,1-1 0,0 1 1,0-1-1,-1 0 1,1 0-1,3 1 1,0-1-1,0-1-1,1 1 1,-1-1 0,0 1 0,0-2 0,0 1 0,0-1 0,0 1 0,0-1 0,0 0-1,0-1 1,-1 0 0,1 1 0,-1-1 0,1-1 0,-1 1 0,0 0 0,-1-1 0,1 0 0,6-9-1,3-5 65,0-1-1,-1-1 0,14-31 1,-9 13 123,-3 0 0,-1 0 0,-2-1 0,-1-1 0,-2 0 0,-2 0 0,-2 0 0,-1-54 0,-16 104-446,3 7 242,0 1-1,1 1 1,-11 34-1,14-36 41,-42 127-22,-7 80-44,-45 423-155,43 20-903,52-603 303,-15 78 0,16-122 664,-1 0-1,-1-1 1,0 1 0,-2-1 0,0-1-1,-1 0 1,-18 27 0,22-38 159,0-1 0,0 1 0,-1-1 0,0-1 0,0 1 0,-1-1 0,0 0 0,0 0 0,0-1 0,0 0 0,-1 0 1,-10 3-1,8-4 45,-1 0 1,0-1 0,0-1 0,0 1-1,0-2 1,0 1 0,0-2 0,-15-1-1,3-2 25,0-1 0,0-2 0,1 0 0,0-1 0,1-1 0,-1-1 0,-36-24 0,10 2 59,1-3-1,2-2 1,1-2-1,2-1 0,-43-55 1,76 84 6,0-1 1,-11-20 0,17 27-109,1 0 1,0 1 0,1-1-1,-1 0 1,1 0 0,0-1-1,0 1 1,0 0-1,1 0 1,0-9 0,0 12-28,0 0 0,1 0 0,-1-1 1,1 1-1,-1 0 0,1 0 0,0 0 1,0 0-1,-1 0 0,1 0 0,1 0 0,-1 0 1,0 0-1,0 1 0,1-1 0,-1 0 1,3-1-1,2-2-2,0 1 0,0 0 0,1 1 1,7-4-1,-9 5 1,157-63-240,-125 51 118,132-46-451,63-18-55,-91 31 377,471-167-604,-407 126 145,-174 75 566,122-68-812,-92 42-2570,-44 27-1225</inkml:trace>
-</inkml:ink>
-</file>
-
-<file path=ppt/ink/ink27.xml><?xml version="1.0" encoding="utf-8"?>
-<inkml:ink xmlns:inkml="http://www.w3.org/2003/InkML">
-  <inkml:definitions>
-    <inkml:context xml:id="ctx0">
-      <inkml:inkSource xml:id="inkSrc0">
-        <inkml:traceFormat>
-          <inkml:channel name="X" type="integer" min="-2.14748E9" max="2.14748E9" units="cm"/>
-          <inkml:channel name="Y" type="integer" min="-2.14748E9" max="2.14748E9" units="cm"/>
-          <inkml:channel name="F" type="integer" max="32767" units="dev"/>
-        </inkml:traceFormat>
-        <inkml:channelProperties>
-          <inkml:channelProperty channel="X" name="resolution" value="1000" units="1/cm"/>
-          <inkml:channelProperty channel="Y" name="resolution" value="1000" units="1/cm"/>
-          <inkml:channelProperty channel="F" name="resolution" value="0" units="1/dev"/>
-        </inkml:channelProperties>
-      </inkml:inkSource>
-      <inkml:timestamp xml:id="ts0" timeString="2024-01-17T09:53:45.419"/>
-    </inkml:context>
-    <inkml:brush xml:id="br0">
-      <inkml:brushProperty name="width" value="0.035" units="cm"/>
-      <inkml:brushProperty name="height" value="0.035" units="cm"/>
-    </inkml:brush>
-  </inkml:definitions>
-  <inkml:trace contextRef="#ctx0" brushRef="#br0">1 626 6545,'0'0'5129,"46"-16"-4910,151-59-212,-180 68-36,0 0 0,0-1 0,-1-1 0,0 0 0,0-1 0,-1-1 0,-1 0 0,0-1 0,0-1 0,12-15 0,-25 27 28,14-16 1,0-1 1,-1 0 0,-1-1-1,-1-1 1,-1 0 0,17-40-1,-23 44 240,0 1 1,0-1-1,-1 0 0,-1 0 0,-1 0 0,-1 0 0,0-1 0,-1 1 0,0-1 1,-4-22-1,3 38-195,1-1 0,-1 0 1,1 1-1,-1-1 0,1 0 0,-1 1 1,0-1-1,0 1 0,0-1 0,0 1 1,0-1-1,0 1 0,0 0 1,0 0-1,-1-1 0,1 1 0,0 0 1,-1 0-1,1 0 0,-1 0 1,1 1-1,-1-1 0,0 0 0,1 1 1,-3-1-1,-4-1 23,1 1-1,-1 0 1,0 0 0,-11 2-1,9-1 15,-4 0-19,1 2 0,0 0 0,0 0 0,0 1-1,0 1 1,0 0 0,0 1 0,1 0 0,0 1-1,0 0 1,1 1 0,0 1 0,0-1 0,0 2-1,1-1 1,-14 17 0,12-12 24,0 1 0,1 0 0,1 0-1,1 1 1,0 1 0,1 0 0,0 0 0,1 0 0,1 1-1,1 0 1,0 0 0,-2 22 0,4-12 20,1 1 0,2 27 0,0-43-90,1-1 1,1 1-1,0-1 0,1 0 0,0 1 0,0-1 0,9 17 1,-6-18-14,0 1 0,0-2 0,2 1 0,-1-1 0,1 0 0,0-1 1,1 1-1,0-2 0,0 1 0,13 7 0,-6-6-245,1-1 0,-1 0-1,1-1 1,0-1 0,35 8-1,-4-7-726,0-1 0,0-3-1,92-6 1,-96 0-673,61-12 1,37-22-4793</inkml:trace>
-</inkml:ink>
-</file>
-
-<file path=ppt/ink/ink28.xml><?xml version="1.0" encoding="utf-8"?>
-<inkml:ink xmlns:inkml="http://www.w3.org/2003/InkML">
-  <inkml:definitions>
-    <inkml:context xml:id="ctx0">
-      <inkml:inkSource xml:id="inkSrc0">
-        <inkml:traceFormat>
-          <inkml:channel name="X" type="integer" min="-2.14748E9" max="2.14748E9" units="cm"/>
-          <inkml:channel name="Y" type="integer" min="-2.14748E9" max="2.14748E9" units="cm"/>
-          <inkml:channel name="F" type="integer" max="32767" units="dev"/>
-        </inkml:traceFormat>
-        <inkml:channelProperties>
-          <inkml:channelProperty channel="X" name="resolution" value="1000" units="1/cm"/>
-          <inkml:channelProperty channel="Y" name="resolution" value="1000" units="1/cm"/>
-          <inkml:channelProperty channel="F" name="resolution" value="0" units="1/dev"/>
-        </inkml:channelProperties>
-      </inkml:inkSource>
-      <inkml:timestamp xml:id="ts0" timeString="2024-01-17T09:53:45.780"/>
-    </inkml:context>
-    <inkml:brush xml:id="br0">
-      <inkml:brushProperty name="width" value="0.035" units="cm"/>
-      <inkml:brushProperty name="height" value="0.035" units="cm"/>
-    </inkml:brush>
-  </inkml:definitions>
-  <inkml:trace contextRef="#ctx0" brushRef="#br0">478 0 10506,'0'0'4465,"-191"341"-3313,92-56 681,15 31-657,23-13-680,27-77-376,26-85-120,8-48-16,0-24-240,19 0-912,57 13-1089,-3-10-567,0-27-3762</inkml:trace>
-</inkml:ink>
-</file>
-
 <file path=ppt/ink/ink3.xml><?xml version="1.0" encoding="utf-8"?>
 <inkml:ink xmlns:inkml="http://www.w3.org/2003/InkML">
   <inkml:definitions>
@@ -9458,8 +9377,8 @@
             <a:chExt cx="2953080" cy="3185640"/>
           </a:xfrm>
         </p:grpSpPr>
-        <mc:AlternateContent xmlns:mc="http://schemas.openxmlformats.org/markup-compatibility/2006">
-          <mc:Choice xmlns:p14="http://schemas.microsoft.com/office/powerpoint/2010/main" Requires="p14">
+        <mc:AlternateContent xmlns:mc="http://schemas.openxmlformats.org/markup-compatibility/2006" xmlns:p14="http://schemas.microsoft.com/office/powerpoint/2010/main">
+          <mc:Choice Requires="p14">
             <p:contentPart p14:bwMode="auto" r:id="rId2">
               <p14:nvContentPartPr>
                 <p14:cNvPr id="4" name="Рукописный ввод 3">
@@ -9478,7 +9397,7 @@
               </p14:xfrm>
             </p:contentPart>
           </mc:Choice>
-          <mc:Fallback>
+          <mc:Fallback xmlns="">
             <p:pic>
               <p:nvPicPr>
                 <p:cNvPr id="4" name="Рукописный ввод 3">
@@ -9509,8 +9428,8 @@
             </p:pic>
           </mc:Fallback>
         </mc:AlternateContent>
-        <mc:AlternateContent xmlns:mc="http://schemas.openxmlformats.org/markup-compatibility/2006">
-          <mc:Choice xmlns:p14="http://schemas.microsoft.com/office/powerpoint/2010/main" Requires="p14">
+        <mc:AlternateContent xmlns:mc="http://schemas.openxmlformats.org/markup-compatibility/2006" xmlns:p14="http://schemas.microsoft.com/office/powerpoint/2010/main">
+          <mc:Choice Requires="p14">
             <p:contentPart p14:bwMode="auto" r:id="rId4">
               <p14:nvContentPartPr>
                 <p14:cNvPr id="5" name="Рукописный ввод 4">
@@ -9529,7 +9448,7 @@
               </p14:xfrm>
             </p:contentPart>
           </mc:Choice>
-          <mc:Fallback>
+          <mc:Fallback xmlns="">
             <p:pic>
               <p:nvPicPr>
                 <p:cNvPr id="5" name="Рукописный ввод 4">
@@ -9560,8 +9479,8 @@
             </p:pic>
           </mc:Fallback>
         </mc:AlternateContent>
-        <mc:AlternateContent xmlns:mc="http://schemas.openxmlformats.org/markup-compatibility/2006">
-          <mc:Choice xmlns:p14="http://schemas.microsoft.com/office/powerpoint/2010/main" Requires="p14">
+        <mc:AlternateContent xmlns:mc="http://schemas.openxmlformats.org/markup-compatibility/2006" xmlns:p14="http://schemas.microsoft.com/office/powerpoint/2010/main">
+          <mc:Choice Requires="p14">
             <p:contentPart p14:bwMode="auto" r:id="rId6">
               <p14:nvContentPartPr>
                 <p14:cNvPr id="6" name="Рукописный ввод 5">
@@ -9580,7 +9499,7 @@
               </p14:xfrm>
             </p:contentPart>
           </mc:Choice>
-          <mc:Fallback>
+          <mc:Fallback xmlns="">
             <p:pic>
               <p:nvPicPr>
                 <p:cNvPr id="6" name="Рукописный ввод 5">
@@ -9611,8 +9530,8 @@
             </p:pic>
           </mc:Fallback>
         </mc:AlternateContent>
-        <mc:AlternateContent xmlns:mc="http://schemas.openxmlformats.org/markup-compatibility/2006">
-          <mc:Choice xmlns:p14="http://schemas.microsoft.com/office/powerpoint/2010/main" Requires="p14">
+        <mc:AlternateContent xmlns:mc="http://schemas.openxmlformats.org/markup-compatibility/2006" xmlns:p14="http://schemas.microsoft.com/office/powerpoint/2010/main">
+          <mc:Choice Requires="p14">
             <p:contentPart p14:bwMode="auto" r:id="rId8">
               <p14:nvContentPartPr>
                 <p14:cNvPr id="7" name="Рукописный ввод 6">
@@ -9631,7 +9550,7 @@
               </p14:xfrm>
             </p:contentPart>
           </mc:Choice>
-          <mc:Fallback>
+          <mc:Fallback xmlns="">
             <p:pic>
               <p:nvPicPr>
                 <p:cNvPr id="7" name="Рукописный ввод 6">
@@ -9662,8 +9581,8 @@
             </p:pic>
           </mc:Fallback>
         </mc:AlternateContent>
-        <mc:AlternateContent xmlns:mc="http://schemas.openxmlformats.org/markup-compatibility/2006">
-          <mc:Choice xmlns:p14="http://schemas.microsoft.com/office/powerpoint/2010/main" Requires="p14">
+        <mc:AlternateContent xmlns:mc="http://schemas.openxmlformats.org/markup-compatibility/2006" xmlns:p14="http://schemas.microsoft.com/office/powerpoint/2010/main">
+          <mc:Choice Requires="p14">
             <p:contentPart p14:bwMode="auto" r:id="rId10">
               <p14:nvContentPartPr>
                 <p14:cNvPr id="8" name="Рукописный ввод 7">
@@ -9682,7 +9601,7 @@
               </p14:xfrm>
             </p:contentPart>
           </mc:Choice>
-          <mc:Fallback>
+          <mc:Fallback xmlns="">
             <p:pic>
               <p:nvPicPr>
                 <p:cNvPr id="8" name="Рукописный ввод 7">
@@ -9713,8 +9632,8 @@
             </p:pic>
           </mc:Fallback>
         </mc:AlternateContent>
-        <mc:AlternateContent xmlns:mc="http://schemas.openxmlformats.org/markup-compatibility/2006">
-          <mc:Choice xmlns:p14="http://schemas.microsoft.com/office/powerpoint/2010/main" Requires="p14">
+        <mc:AlternateContent xmlns:mc="http://schemas.openxmlformats.org/markup-compatibility/2006" xmlns:p14="http://schemas.microsoft.com/office/powerpoint/2010/main">
+          <mc:Choice Requires="p14">
             <p:contentPart p14:bwMode="auto" r:id="rId12">
               <p14:nvContentPartPr>
                 <p14:cNvPr id="9" name="Рукописный ввод 8">
@@ -9733,7 +9652,7 @@
               </p14:xfrm>
             </p:contentPart>
           </mc:Choice>
-          <mc:Fallback>
+          <mc:Fallback xmlns="">
             <p:pic>
               <p:nvPicPr>
                 <p:cNvPr id="9" name="Рукописный ввод 8">
@@ -9764,8 +9683,8 @@
             </p:pic>
           </mc:Fallback>
         </mc:AlternateContent>
-        <mc:AlternateContent xmlns:mc="http://schemas.openxmlformats.org/markup-compatibility/2006">
-          <mc:Choice xmlns:p14="http://schemas.microsoft.com/office/powerpoint/2010/main" Requires="p14">
+        <mc:AlternateContent xmlns:mc="http://schemas.openxmlformats.org/markup-compatibility/2006" xmlns:p14="http://schemas.microsoft.com/office/powerpoint/2010/main">
+          <mc:Choice Requires="p14">
             <p:contentPart p14:bwMode="auto" r:id="rId14">
               <p14:nvContentPartPr>
                 <p14:cNvPr id="10" name="Рукописный ввод 9">
@@ -9784,7 +9703,7 @@
               </p14:xfrm>
             </p:contentPart>
           </mc:Choice>
-          <mc:Fallback>
+          <mc:Fallback xmlns="">
             <p:pic>
               <p:nvPicPr>
                 <p:cNvPr id="10" name="Рукописный ввод 9">
@@ -9815,8 +9734,8 @@
             </p:pic>
           </mc:Fallback>
         </mc:AlternateContent>
-        <mc:AlternateContent xmlns:mc="http://schemas.openxmlformats.org/markup-compatibility/2006">
-          <mc:Choice xmlns:p14="http://schemas.microsoft.com/office/powerpoint/2010/main" Requires="p14">
+        <mc:AlternateContent xmlns:mc="http://schemas.openxmlformats.org/markup-compatibility/2006" xmlns:p14="http://schemas.microsoft.com/office/powerpoint/2010/main">
+          <mc:Choice Requires="p14">
             <p:contentPart p14:bwMode="auto" r:id="rId16">
               <p14:nvContentPartPr>
                 <p14:cNvPr id="11" name="Рукописный ввод 10">
@@ -9835,7 +9754,7 @@
               </p14:xfrm>
             </p:contentPart>
           </mc:Choice>
-          <mc:Fallback>
+          <mc:Fallback xmlns="">
             <p:pic>
               <p:nvPicPr>
                 <p:cNvPr id="11" name="Рукописный ввод 10">
@@ -9866,8 +9785,8 @@
             </p:pic>
           </mc:Fallback>
         </mc:AlternateContent>
-        <mc:AlternateContent xmlns:mc="http://schemas.openxmlformats.org/markup-compatibility/2006">
-          <mc:Choice xmlns:p14="http://schemas.microsoft.com/office/powerpoint/2010/main" Requires="p14">
+        <mc:AlternateContent xmlns:mc="http://schemas.openxmlformats.org/markup-compatibility/2006" xmlns:p14="http://schemas.microsoft.com/office/powerpoint/2010/main">
+          <mc:Choice Requires="p14">
             <p:contentPart p14:bwMode="auto" r:id="rId18">
               <p14:nvContentPartPr>
                 <p14:cNvPr id="13" name="Рукописный ввод 12">
@@ -9886,7 +9805,7 @@
               </p14:xfrm>
             </p:contentPart>
           </mc:Choice>
-          <mc:Fallback>
+          <mc:Fallback xmlns="">
             <p:pic>
               <p:nvPicPr>
                 <p:cNvPr id="13" name="Рукописный ввод 12">
@@ -9917,8 +9836,8 @@
             </p:pic>
           </mc:Fallback>
         </mc:AlternateContent>
-        <mc:AlternateContent xmlns:mc="http://schemas.openxmlformats.org/markup-compatibility/2006">
-          <mc:Choice xmlns:p14="http://schemas.microsoft.com/office/powerpoint/2010/main" Requires="p14">
+        <mc:AlternateContent xmlns:mc="http://schemas.openxmlformats.org/markup-compatibility/2006" xmlns:p14="http://schemas.microsoft.com/office/powerpoint/2010/main">
+          <mc:Choice Requires="p14">
             <p:contentPart p14:bwMode="auto" r:id="rId20">
               <p14:nvContentPartPr>
                 <p14:cNvPr id="14" name="Рукописный ввод 13">
@@ -9937,7 +9856,7 @@
               </p14:xfrm>
             </p:contentPart>
           </mc:Choice>
-          <mc:Fallback>
+          <mc:Fallback xmlns="">
             <p:pic>
               <p:nvPicPr>
                 <p:cNvPr id="14" name="Рукописный ввод 13">
@@ -9968,8 +9887,8 @@
             </p:pic>
           </mc:Fallback>
         </mc:AlternateContent>
-        <mc:AlternateContent xmlns:mc="http://schemas.openxmlformats.org/markup-compatibility/2006">
-          <mc:Choice xmlns:p14="http://schemas.microsoft.com/office/powerpoint/2010/main" Requires="p14">
+        <mc:AlternateContent xmlns:mc="http://schemas.openxmlformats.org/markup-compatibility/2006" xmlns:p14="http://schemas.microsoft.com/office/powerpoint/2010/main">
+          <mc:Choice Requires="p14">
             <p:contentPart p14:bwMode="auto" r:id="rId22">
               <p14:nvContentPartPr>
                 <p14:cNvPr id="16" name="Рукописный ввод 15">
@@ -9988,7 +9907,7 @@
               </p14:xfrm>
             </p:contentPart>
           </mc:Choice>
-          <mc:Fallback>
+          <mc:Fallback xmlns="">
             <p:pic>
               <p:nvPicPr>
                 <p:cNvPr id="16" name="Рукописный ввод 15">
@@ -10019,8 +9938,8 @@
             </p:pic>
           </mc:Fallback>
         </mc:AlternateContent>
-        <mc:AlternateContent xmlns:mc="http://schemas.openxmlformats.org/markup-compatibility/2006">
-          <mc:Choice xmlns:p14="http://schemas.microsoft.com/office/powerpoint/2010/main" Requires="p14">
+        <mc:AlternateContent xmlns:mc="http://schemas.openxmlformats.org/markup-compatibility/2006" xmlns:p14="http://schemas.microsoft.com/office/powerpoint/2010/main">
+          <mc:Choice Requires="p14">
             <p:contentPart p14:bwMode="auto" r:id="rId24">
               <p14:nvContentPartPr>
                 <p14:cNvPr id="17" name="Рукописный ввод 16">
@@ -10039,7 +9958,7 @@
               </p14:xfrm>
             </p:contentPart>
           </mc:Choice>
-          <mc:Fallback>
+          <mc:Fallback xmlns="">
             <p:pic>
               <p:nvPicPr>
                 <p:cNvPr id="17" name="Рукописный ввод 16">
@@ -10070,8 +9989,8 @@
             </p:pic>
           </mc:Fallback>
         </mc:AlternateContent>
-        <mc:AlternateContent xmlns:mc="http://schemas.openxmlformats.org/markup-compatibility/2006">
-          <mc:Choice xmlns:p14="http://schemas.microsoft.com/office/powerpoint/2010/main" Requires="p14">
+        <mc:AlternateContent xmlns:mc="http://schemas.openxmlformats.org/markup-compatibility/2006" xmlns:p14="http://schemas.microsoft.com/office/powerpoint/2010/main">
+          <mc:Choice Requires="p14">
             <p:contentPart p14:bwMode="auto" r:id="rId26">
               <p14:nvContentPartPr>
                 <p14:cNvPr id="18" name="Рукописный ввод 17">
@@ -10090,7 +10009,7 @@
               </p14:xfrm>
             </p:contentPart>
           </mc:Choice>
-          <mc:Fallback>
+          <mc:Fallback xmlns="">
             <p:pic>
               <p:nvPicPr>
                 <p:cNvPr id="18" name="Рукописный ввод 17">
@@ -10121,8 +10040,8 @@
             </p:pic>
           </mc:Fallback>
         </mc:AlternateContent>
-        <mc:AlternateContent xmlns:mc="http://schemas.openxmlformats.org/markup-compatibility/2006">
-          <mc:Choice xmlns:p14="http://schemas.microsoft.com/office/powerpoint/2010/main" Requires="p14">
+        <mc:AlternateContent xmlns:mc="http://schemas.openxmlformats.org/markup-compatibility/2006" xmlns:p14="http://schemas.microsoft.com/office/powerpoint/2010/main">
+          <mc:Choice Requires="p14">
             <p:contentPart p14:bwMode="auto" r:id="rId28">
               <p14:nvContentPartPr>
                 <p14:cNvPr id="19" name="Рукописный ввод 18">
@@ -10141,7 +10060,7 @@
               </p14:xfrm>
             </p:contentPart>
           </mc:Choice>
-          <mc:Fallback>
+          <mc:Fallback xmlns="">
             <p:pic>
               <p:nvPicPr>
                 <p:cNvPr id="19" name="Рукописный ввод 18">
@@ -10172,8 +10091,8 @@
             </p:pic>
           </mc:Fallback>
         </mc:AlternateContent>
-        <mc:AlternateContent xmlns:mc="http://schemas.openxmlformats.org/markup-compatibility/2006">
-          <mc:Choice xmlns:p14="http://schemas.microsoft.com/office/powerpoint/2010/main" Requires="p14">
+        <mc:AlternateContent xmlns:mc="http://schemas.openxmlformats.org/markup-compatibility/2006" xmlns:p14="http://schemas.microsoft.com/office/powerpoint/2010/main">
+          <mc:Choice Requires="p14">
             <p:contentPart p14:bwMode="auto" r:id="rId30">
               <p14:nvContentPartPr>
                 <p14:cNvPr id="20" name="Рукописный ввод 19">
@@ -10192,7 +10111,7 @@
               </p14:xfrm>
             </p:contentPart>
           </mc:Choice>
-          <mc:Fallback>
+          <mc:Fallback xmlns="">
             <p:pic>
               <p:nvPicPr>
                 <p:cNvPr id="20" name="Рукописный ввод 19">
@@ -10223,8 +10142,8 @@
             </p:pic>
           </mc:Fallback>
         </mc:AlternateContent>
-        <mc:AlternateContent xmlns:mc="http://schemas.openxmlformats.org/markup-compatibility/2006">
-          <mc:Choice xmlns:p14="http://schemas.microsoft.com/office/powerpoint/2010/main" Requires="p14">
+        <mc:AlternateContent xmlns:mc="http://schemas.openxmlformats.org/markup-compatibility/2006" xmlns:p14="http://schemas.microsoft.com/office/powerpoint/2010/main">
+          <mc:Choice Requires="p14">
             <p:contentPart p14:bwMode="auto" r:id="rId32">
               <p14:nvContentPartPr>
                 <p14:cNvPr id="21" name="Рукописный ввод 20">
@@ -10243,7 +10162,7 @@
               </p14:xfrm>
             </p:contentPart>
           </mc:Choice>
-          <mc:Fallback>
+          <mc:Fallback xmlns="">
             <p:pic>
               <p:nvPicPr>
                 <p:cNvPr id="21" name="Рукописный ввод 20">
@@ -10274,8 +10193,8 @@
             </p:pic>
           </mc:Fallback>
         </mc:AlternateContent>
-        <mc:AlternateContent xmlns:mc="http://schemas.openxmlformats.org/markup-compatibility/2006">
-          <mc:Choice xmlns:p14="http://schemas.microsoft.com/office/powerpoint/2010/main" Requires="p14">
+        <mc:AlternateContent xmlns:mc="http://schemas.openxmlformats.org/markup-compatibility/2006" xmlns:p14="http://schemas.microsoft.com/office/powerpoint/2010/main">
+          <mc:Choice Requires="p14">
             <p:contentPart p14:bwMode="auto" r:id="rId34">
               <p14:nvContentPartPr>
                 <p14:cNvPr id="24" name="Рукописный ввод 23">
@@ -10294,7 +10213,7 @@
               </p14:xfrm>
             </p:contentPart>
           </mc:Choice>
-          <mc:Fallback>
+          <mc:Fallback xmlns="">
             <p:pic>
               <p:nvPicPr>
                 <p:cNvPr id="24" name="Рукописный ввод 23">
@@ -10325,8 +10244,8 @@
             </p:pic>
           </mc:Fallback>
         </mc:AlternateContent>
-        <mc:AlternateContent xmlns:mc="http://schemas.openxmlformats.org/markup-compatibility/2006">
-          <mc:Choice xmlns:p14="http://schemas.microsoft.com/office/powerpoint/2010/main" Requires="p14">
+        <mc:AlternateContent xmlns:mc="http://schemas.openxmlformats.org/markup-compatibility/2006" xmlns:p14="http://schemas.microsoft.com/office/powerpoint/2010/main">
+          <mc:Choice Requires="p14">
             <p:contentPart p14:bwMode="auto" r:id="rId36">
               <p14:nvContentPartPr>
                 <p14:cNvPr id="25" name="Рукописный ввод 24">
@@ -10345,7 +10264,7 @@
               </p14:xfrm>
             </p:contentPart>
           </mc:Choice>
-          <mc:Fallback>
+          <mc:Fallback xmlns="">
             <p:pic>
               <p:nvPicPr>
                 <p:cNvPr id="25" name="Рукописный ввод 24">
@@ -10376,8 +10295,8 @@
             </p:pic>
           </mc:Fallback>
         </mc:AlternateContent>
-        <mc:AlternateContent xmlns:mc="http://schemas.openxmlformats.org/markup-compatibility/2006">
-          <mc:Choice xmlns:p14="http://schemas.microsoft.com/office/powerpoint/2010/main" Requires="p14">
+        <mc:AlternateContent xmlns:mc="http://schemas.openxmlformats.org/markup-compatibility/2006" xmlns:p14="http://schemas.microsoft.com/office/powerpoint/2010/main">
+          <mc:Choice Requires="p14">
             <p:contentPart p14:bwMode="auto" r:id="rId38">
               <p14:nvContentPartPr>
                 <p14:cNvPr id="27" name="Рукописный ввод 26">
@@ -10396,7 +10315,7 @@
               </p14:xfrm>
             </p:contentPart>
           </mc:Choice>
-          <mc:Fallback>
+          <mc:Fallback xmlns="">
             <p:pic>
               <p:nvPicPr>
                 <p:cNvPr id="27" name="Рукописный ввод 26">
@@ -10448,8 +10367,8 @@
             <a:chExt cx="1202040" cy="495720"/>
           </a:xfrm>
         </p:grpSpPr>
-        <mc:AlternateContent xmlns:mc="http://schemas.openxmlformats.org/markup-compatibility/2006">
-          <mc:Choice xmlns:p14="http://schemas.microsoft.com/office/powerpoint/2010/main" Requires="p14">
+        <mc:AlternateContent xmlns:mc="http://schemas.openxmlformats.org/markup-compatibility/2006" xmlns:p14="http://schemas.microsoft.com/office/powerpoint/2010/main">
+          <mc:Choice Requires="p14">
             <p:contentPart p14:bwMode="auto" r:id="rId40">
               <p14:nvContentPartPr>
                 <p14:cNvPr id="29" name="Рукописный ввод 28">
@@ -10468,7 +10387,7 @@
               </p14:xfrm>
             </p:contentPart>
           </mc:Choice>
-          <mc:Fallback>
+          <mc:Fallback xmlns="">
             <p:pic>
               <p:nvPicPr>
                 <p:cNvPr id="29" name="Рукописный ввод 28">
@@ -10499,8 +10418,8 @@
             </p:pic>
           </mc:Fallback>
         </mc:AlternateContent>
-        <mc:AlternateContent xmlns:mc="http://schemas.openxmlformats.org/markup-compatibility/2006">
-          <mc:Choice xmlns:p14="http://schemas.microsoft.com/office/powerpoint/2010/main" Requires="p14">
+        <mc:AlternateContent xmlns:mc="http://schemas.openxmlformats.org/markup-compatibility/2006" xmlns:p14="http://schemas.microsoft.com/office/powerpoint/2010/main">
+          <mc:Choice Requires="p14">
             <p:contentPart p14:bwMode="auto" r:id="rId42">
               <p14:nvContentPartPr>
                 <p14:cNvPr id="30" name="Рукописный ввод 29">
@@ -10519,7 +10438,7 @@
               </p14:xfrm>
             </p:contentPart>
           </mc:Choice>
-          <mc:Fallback>
+          <mc:Fallback xmlns="">
             <p:pic>
               <p:nvPicPr>
                 <p:cNvPr id="30" name="Рукописный ввод 29">
@@ -10550,8 +10469,8 @@
             </p:pic>
           </mc:Fallback>
         </mc:AlternateContent>
-        <mc:AlternateContent xmlns:mc="http://schemas.openxmlformats.org/markup-compatibility/2006">
-          <mc:Choice xmlns:p14="http://schemas.microsoft.com/office/powerpoint/2010/main" Requires="p14">
+        <mc:AlternateContent xmlns:mc="http://schemas.openxmlformats.org/markup-compatibility/2006" xmlns:p14="http://schemas.microsoft.com/office/powerpoint/2010/main">
+          <mc:Choice Requires="p14">
             <p:contentPart p14:bwMode="auto" r:id="rId44">
               <p14:nvContentPartPr>
                 <p14:cNvPr id="31" name="Рукописный ввод 30">
@@ -10570,7 +10489,7 @@
               </p14:xfrm>
             </p:contentPart>
           </mc:Choice>
-          <mc:Fallback>
+          <mc:Fallback xmlns="">
             <p:pic>
               <p:nvPicPr>
                 <p:cNvPr id="31" name="Рукописный ввод 30">
@@ -10622,8 +10541,8 @@
             <a:chExt cx="1002960" cy="470520"/>
           </a:xfrm>
         </p:grpSpPr>
-        <mc:AlternateContent xmlns:mc="http://schemas.openxmlformats.org/markup-compatibility/2006">
-          <mc:Choice xmlns:p14="http://schemas.microsoft.com/office/powerpoint/2010/main" Requires="p14">
+        <mc:AlternateContent xmlns:mc="http://schemas.openxmlformats.org/markup-compatibility/2006" xmlns:p14="http://schemas.microsoft.com/office/powerpoint/2010/main">
+          <mc:Choice Requires="p14">
             <p:contentPart p14:bwMode="auto" r:id="rId46">
               <p14:nvContentPartPr>
                 <p14:cNvPr id="32" name="Рукописный ввод 31">
@@ -10642,7 +10561,7 @@
               </p14:xfrm>
             </p:contentPart>
           </mc:Choice>
-          <mc:Fallback>
+          <mc:Fallback xmlns="">
             <p:pic>
               <p:nvPicPr>
                 <p:cNvPr id="32" name="Рукописный ввод 31">
@@ -10673,8 +10592,8 @@
             </p:pic>
           </mc:Fallback>
         </mc:AlternateContent>
-        <mc:AlternateContent xmlns:mc="http://schemas.openxmlformats.org/markup-compatibility/2006">
-          <mc:Choice xmlns:p14="http://schemas.microsoft.com/office/powerpoint/2010/main" Requires="p14">
+        <mc:AlternateContent xmlns:mc="http://schemas.openxmlformats.org/markup-compatibility/2006" xmlns:p14="http://schemas.microsoft.com/office/powerpoint/2010/main">
+          <mc:Choice Requires="p14">
             <p:contentPart p14:bwMode="auto" r:id="rId48">
               <p14:nvContentPartPr>
                 <p14:cNvPr id="33" name="Рукописный ввод 32">
@@ -10693,7 +10612,7 @@
               </p14:xfrm>
             </p:contentPart>
           </mc:Choice>
-          <mc:Fallback>
+          <mc:Fallback xmlns="">
             <p:pic>
               <p:nvPicPr>
                 <p:cNvPr id="33" name="Рукописный ввод 32">
@@ -10724,8 +10643,8 @@
             </p:pic>
           </mc:Fallback>
         </mc:AlternateContent>
-        <mc:AlternateContent xmlns:mc="http://schemas.openxmlformats.org/markup-compatibility/2006">
-          <mc:Choice xmlns:p14="http://schemas.microsoft.com/office/powerpoint/2010/main" Requires="p14">
+        <mc:AlternateContent xmlns:mc="http://schemas.openxmlformats.org/markup-compatibility/2006" xmlns:p14="http://schemas.microsoft.com/office/powerpoint/2010/main">
+          <mc:Choice Requires="p14">
             <p:contentPart p14:bwMode="auto" r:id="rId50">
               <p14:nvContentPartPr>
                 <p14:cNvPr id="34" name="Рукописный ввод 33">
@@ -10744,7 +10663,7 @@
               </p14:xfrm>
             </p:contentPart>
           </mc:Choice>
-          <mc:Fallback>
+          <mc:Fallback xmlns="">
             <p:pic>
               <p:nvPicPr>
                 <p:cNvPr id="34" name="Рукописный ввод 33">
@@ -11474,159 +11393,6 @@
           </a:p>
         </p:txBody>
       </p:sp>
-      <mc:AlternateContent xmlns:mc="http://schemas.openxmlformats.org/markup-compatibility/2006">
-        <mc:Choice xmlns:p14="http://schemas.microsoft.com/office/powerpoint/2010/main" Requires="p14">
-          <p:contentPart p14:bwMode="auto" r:id="rId2">
-            <p14:nvContentPartPr>
-              <p14:cNvPr id="8" name="Рукописный ввод 7">
-                <a:extLst>
-                  <a:ext uri="{FF2B5EF4-FFF2-40B4-BE49-F238E27FC236}">
-                    <a16:creationId xmlns:a16="http://schemas.microsoft.com/office/drawing/2014/main" id="{2497675B-DFA4-5ED8-568B-A260E488A8AE}"/>
-                  </a:ext>
-                </a:extLst>
-              </p14:cNvPr>
-              <p14:cNvContentPartPr/>
-              <p14:nvPr/>
-            </p14:nvContentPartPr>
-            <p14:xfrm>
-              <a:off x="3832320" y="5576914"/>
-              <a:ext cx="677880" cy="858240"/>
-            </p14:xfrm>
-          </p:contentPart>
-        </mc:Choice>
-        <mc:Fallback>
-          <p:pic>
-            <p:nvPicPr>
-              <p:cNvPr id="8" name="Рукописный ввод 7">
-                <a:extLst>
-                  <a:ext uri="{FF2B5EF4-FFF2-40B4-BE49-F238E27FC236}">
-                    <a16:creationId xmlns:a16="http://schemas.microsoft.com/office/drawing/2014/main" id="{2497675B-DFA4-5ED8-568B-A260E488A8AE}"/>
-                  </a:ext>
-                </a:extLst>
-              </p:cNvPr>
-              <p:cNvPicPr/>
-              <p:nvPr/>
-            </p:nvPicPr>
-            <p:blipFill>
-              <a:blip r:embed="rId3"/>
-              <a:stretch>
-                <a:fillRect/>
-              </a:stretch>
-            </p:blipFill>
-            <p:spPr>
-              <a:xfrm>
-                <a:off x="3826200" y="5570794"/>
-                <a:ext cx="690120" cy="870480"/>
-              </a:xfrm>
-              <a:prstGeom prst="rect">
-                <a:avLst/>
-              </a:prstGeom>
-            </p:spPr>
-          </p:pic>
-        </mc:Fallback>
-      </mc:AlternateContent>
-      <mc:AlternateContent xmlns:mc="http://schemas.openxmlformats.org/markup-compatibility/2006">
-        <mc:Choice xmlns:p14="http://schemas.microsoft.com/office/powerpoint/2010/main" Requires="p14">
-          <p:contentPart p14:bwMode="auto" r:id="rId4">
-            <p14:nvContentPartPr>
-              <p14:cNvPr id="9" name="Рукописный ввод 8">
-                <a:extLst>
-                  <a:ext uri="{FF2B5EF4-FFF2-40B4-BE49-F238E27FC236}">
-                    <a16:creationId xmlns:a16="http://schemas.microsoft.com/office/drawing/2014/main" id="{7D214BCD-ABF8-8645-02BA-7A51CF1B8925}"/>
-                  </a:ext>
-                </a:extLst>
-              </p14:cNvPr>
-              <p14:cNvContentPartPr/>
-              <p14:nvPr/>
-            </p14:nvContentPartPr>
-            <p14:xfrm>
-              <a:off x="4361160" y="5642074"/>
-              <a:ext cx="348120" cy="258840"/>
-            </p14:xfrm>
-          </p:contentPart>
-        </mc:Choice>
-        <mc:Fallback>
-          <p:pic>
-            <p:nvPicPr>
-              <p:cNvPr id="9" name="Рукописный ввод 8">
-                <a:extLst>
-                  <a:ext uri="{FF2B5EF4-FFF2-40B4-BE49-F238E27FC236}">
-                    <a16:creationId xmlns:a16="http://schemas.microsoft.com/office/drawing/2014/main" id="{7D214BCD-ABF8-8645-02BA-7A51CF1B8925}"/>
-                  </a:ext>
-                </a:extLst>
-              </p:cNvPr>
-              <p:cNvPicPr/>
-              <p:nvPr/>
-            </p:nvPicPr>
-            <p:blipFill>
-              <a:blip r:embed="rId5"/>
-              <a:stretch>
-                <a:fillRect/>
-              </a:stretch>
-            </p:blipFill>
-            <p:spPr>
-              <a:xfrm>
-                <a:off x="4355040" y="5635954"/>
-                <a:ext cx="360360" cy="271080"/>
-              </a:xfrm>
-              <a:prstGeom prst="rect">
-                <a:avLst/>
-              </a:prstGeom>
-            </p:spPr>
-          </p:pic>
-        </mc:Fallback>
-      </mc:AlternateContent>
-      <mc:AlternateContent xmlns:mc="http://schemas.openxmlformats.org/markup-compatibility/2006">
-        <mc:Choice xmlns:p14="http://schemas.microsoft.com/office/powerpoint/2010/main" Requires="p14">
-          <p:contentPart p14:bwMode="auto" r:id="rId6">
-            <p14:nvContentPartPr>
-              <p14:cNvPr id="10" name="Рукописный ввод 9">
-                <a:extLst>
-                  <a:ext uri="{FF2B5EF4-FFF2-40B4-BE49-F238E27FC236}">
-                    <a16:creationId xmlns:a16="http://schemas.microsoft.com/office/drawing/2014/main" id="{D4B200A2-74C1-7C52-BF54-8018B51A126E}"/>
-                  </a:ext>
-                </a:extLst>
-              </p14:cNvPr>
-              <p14:cNvContentPartPr/>
-              <p14:nvPr/>
-            </p14:nvContentPartPr>
-            <p14:xfrm>
-              <a:off x="4802520" y="5343994"/>
-              <a:ext cx="172080" cy="735480"/>
-            </p14:xfrm>
-          </p:contentPart>
-        </mc:Choice>
-        <mc:Fallback>
-          <p:pic>
-            <p:nvPicPr>
-              <p:cNvPr id="10" name="Рукописный ввод 9">
-                <a:extLst>
-                  <a:ext uri="{FF2B5EF4-FFF2-40B4-BE49-F238E27FC236}">
-                    <a16:creationId xmlns:a16="http://schemas.microsoft.com/office/drawing/2014/main" id="{D4B200A2-74C1-7C52-BF54-8018B51A126E}"/>
-                  </a:ext>
-                </a:extLst>
-              </p:cNvPr>
-              <p:cNvPicPr/>
-              <p:nvPr/>
-            </p:nvPicPr>
-            <p:blipFill>
-              <a:blip r:embed="rId7"/>
-              <a:stretch>
-                <a:fillRect/>
-              </a:stretch>
-            </p:blipFill>
-            <p:spPr>
-              <a:xfrm>
-                <a:off x="4796400" y="5337874"/>
-                <a:ext cx="184320" cy="747720"/>
-              </a:xfrm>
-              <a:prstGeom prst="rect">
-                <a:avLst/>
-              </a:prstGeom>
-            </p:spPr>
-          </p:pic>
-        </mc:Fallback>
-      </mc:AlternateContent>
     </p:spTree>
   </p:cSld>
   <p:clrMapOvr>

</xml_diff>